<commit_message>
Added background image to body, minor graphic changes
</commit_message>
<xml_diff>
--- a/hangman_js.pptx
+++ b/hangman_js.pptx
@@ -288,7 +288,7 @@
           <a:p>
             <a:fld id="{BE91A9B7-2336-4CDB-8969-074A56AEFB1B}" type="datetimeFigureOut">
               <a:rPr lang="en-US" smtClean="0"/>
-              <a:t>5/19/2018</a:t>
+              <a:t>5/31/2018</a:t>
             </a:fld>
             <a:endParaRPr lang="en-US"/>
           </a:p>
@@ -458,7 +458,7 @@
           <a:p>
             <a:fld id="{BE91A9B7-2336-4CDB-8969-074A56AEFB1B}" type="datetimeFigureOut">
               <a:rPr lang="en-US" smtClean="0"/>
-              <a:t>5/19/2018</a:t>
+              <a:t>5/31/2018</a:t>
             </a:fld>
             <a:endParaRPr lang="en-US"/>
           </a:p>
@@ -638,7 +638,7 @@
           <a:p>
             <a:fld id="{BE91A9B7-2336-4CDB-8969-074A56AEFB1B}" type="datetimeFigureOut">
               <a:rPr lang="en-US" smtClean="0"/>
-              <a:t>5/19/2018</a:t>
+              <a:t>5/31/2018</a:t>
             </a:fld>
             <a:endParaRPr lang="en-US"/>
           </a:p>
@@ -808,7 +808,7 @@
           <a:p>
             <a:fld id="{BE91A9B7-2336-4CDB-8969-074A56AEFB1B}" type="datetimeFigureOut">
               <a:rPr lang="en-US" smtClean="0"/>
-              <a:t>5/19/2018</a:t>
+              <a:t>5/31/2018</a:t>
             </a:fld>
             <a:endParaRPr lang="en-US"/>
           </a:p>
@@ -1054,7 +1054,7 @@
           <a:p>
             <a:fld id="{BE91A9B7-2336-4CDB-8969-074A56AEFB1B}" type="datetimeFigureOut">
               <a:rPr lang="en-US" smtClean="0"/>
-              <a:t>5/19/2018</a:t>
+              <a:t>5/31/2018</a:t>
             </a:fld>
             <a:endParaRPr lang="en-US"/>
           </a:p>
@@ -1342,7 +1342,7 @@
           <a:p>
             <a:fld id="{BE91A9B7-2336-4CDB-8969-074A56AEFB1B}" type="datetimeFigureOut">
               <a:rPr lang="en-US" smtClean="0"/>
-              <a:t>5/19/2018</a:t>
+              <a:t>5/31/2018</a:t>
             </a:fld>
             <a:endParaRPr lang="en-US"/>
           </a:p>
@@ -1764,7 +1764,7 @@
           <a:p>
             <a:fld id="{BE91A9B7-2336-4CDB-8969-074A56AEFB1B}" type="datetimeFigureOut">
               <a:rPr lang="en-US" smtClean="0"/>
-              <a:t>5/19/2018</a:t>
+              <a:t>5/31/2018</a:t>
             </a:fld>
             <a:endParaRPr lang="en-US"/>
           </a:p>
@@ -1882,7 +1882,7 @@
           <a:p>
             <a:fld id="{BE91A9B7-2336-4CDB-8969-074A56AEFB1B}" type="datetimeFigureOut">
               <a:rPr lang="en-US" smtClean="0"/>
-              <a:t>5/19/2018</a:t>
+              <a:t>5/31/2018</a:t>
             </a:fld>
             <a:endParaRPr lang="en-US"/>
           </a:p>
@@ -1977,7 +1977,7 @@
           <a:p>
             <a:fld id="{BE91A9B7-2336-4CDB-8969-074A56AEFB1B}" type="datetimeFigureOut">
               <a:rPr lang="en-US" smtClean="0"/>
-              <a:t>5/19/2018</a:t>
+              <a:t>5/31/2018</a:t>
             </a:fld>
             <a:endParaRPr lang="en-US"/>
           </a:p>
@@ -2254,7 +2254,7 @@
           <a:p>
             <a:fld id="{BE91A9B7-2336-4CDB-8969-074A56AEFB1B}" type="datetimeFigureOut">
               <a:rPr lang="en-US" smtClean="0"/>
-              <a:t>5/19/2018</a:t>
+              <a:t>5/31/2018</a:t>
             </a:fld>
             <a:endParaRPr lang="en-US"/>
           </a:p>
@@ -2507,7 +2507,7 @@
           <a:p>
             <a:fld id="{BE91A9B7-2336-4CDB-8969-074A56AEFB1B}" type="datetimeFigureOut">
               <a:rPr lang="en-US" smtClean="0"/>
-              <a:t>5/19/2018</a:t>
+              <a:t>5/31/2018</a:t>
             </a:fld>
             <a:endParaRPr lang="en-US"/>
           </a:p>
@@ -2720,7 +2720,7 @@
           <a:p>
             <a:fld id="{BE91A9B7-2336-4CDB-8969-074A56AEFB1B}" type="datetimeFigureOut">
               <a:rPr lang="en-US" smtClean="0"/>
-              <a:t>5/19/2018</a:t>
+              <a:t>5/31/2018</a:t>
             </a:fld>
             <a:endParaRPr lang="en-US"/>
           </a:p>
@@ -3097,21 +3097,166 @@
       </p:grpSpPr>
       <p:cxnSp>
         <p:nvCxnSpPr>
-          <p:cNvPr id="8" name="Straight Connector 7"/>
+          <p:cNvPr id="132" name="Elbow Connector 131"/>
           <p:cNvCxnSpPr>
-            <a:stCxn id="4" idx="3"/>
-            <a:endCxn id="6" idx="1"/>
+            <a:stCxn id="170" idx="2"/>
+            <a:endCxn id="133" idx="3"/>
           </p:cNvCxnSpPr>
           <p:nvPr/>
         </p:nvCxnSpPr>
         <p:spPr>
-          <a:xfrm>
-            <a:off x="4191000" y="906780"/>
-            <a:ext cx="609600" cy="0"/>
+          <a:xfrm rot="5400000">
+            <a:off x="7678498" y="4740987"/>
+            <a:ext cx="453390" cy="420217"/>
+          </a:xfrm>
+          <a:prstGeom prst="bentConnector2">
+            <a:avLst/>
+          </a:prstGeom>
+          <a:ln>
+            <a:headEnd type="none" w="med" len="med"/>
+            <a:tailEnd type="triangle" w="med" len="med"/>
+          </a:ln>
+        </p:spPr>
+        <p:style>
+          <a:lnRef idx="1">
+            <a:schemeClr val="accent2"/>
+          </a:lnRef>
+          <a:fillRef idx="0">
+            <a:schemeClr val="accent2"/>
+          </a:fillRef>
+          <a:effectRef idx="0">
+            <a:schemeClr val="accent2"/>
+          </a:effectRef>
+          <a:fontRef idx="minor">
+            <a:schemeClr val="tx1"/>
+          </a:fontRef>
+        </p:style>
+      </p:cxnSp>
+      <p:cxnSp>
+        <p:nvCxnSpPr>
+          <p:cNvPr id="79" name="Elbow Connector 78"/>
+          <p:cNvCxnSpPr>
+            <a:stCxn id="150" idx="3"/>
+            <a:endCxn id="122" idx="1"/>
+          </p:cNvCxnSpPr>
+          <p:nvPr/>
+        </p:nvCxnSpPr>
+        <p:spPr>
+          <a:xfrm>
+            <a:off x="5457825" y="3152299"/>
+            <a:ext cx="410690" cy="339044"/>
+          </a:xfrm>
+          <a:prstGeom prst="bentConnector3">
+            <a:avLst>
+              <a:gd name="adj1" fmla="val 50000"/>
+            </a:avLst>
+          </a:prstGeom>
+          <a:ln>
+            <a:headEnd type="none" w="med" len="med"/>
+            <a:tailEnd type="triangle" w="med" len="med"/>
+          </a:ln>
+        </p:spPr>
+        <p:style>
+          <a:lnRef idx="1">
+            <a:schemeClr val="accent2"/>
+          </a:lnRef>
+          <a:fillRef idx="0">
+            <a:schemeClr val="accent2"/>
+          </a:fillRef>
+          <a:effectRef idx="0">
+            <a:schemeClr val="accent2"/>
+          </a:effectRef>
+          <a:fontRef idx="minor">
+            <a:schemeClr val="tx1"/>
+          </a:fontRef>
+        </p:style>
+      </p:cxnSp>
+      <p:cxnSp>
+        <p:nvCxnSpPr>
+          <p:cNvPr id="46" name="Elbow Connector 45"/>
+          <p:cNvCxnSpPr>
+            <a:endCxn id="43" idx="1"/>
+          </p:cNvCxnSpPr>
+          <p:nvPr/>
+        </p:nvCxnSpPr>
+        <p:spPr>
+          <a:xfrm rot="16200000" flipH="1">
+            <a:off x="2324496" y="1371317"/>
+            <a:ext cx="762000" cy="123825"/>
+          </a:xfrm>
+          <a:prstGeom prst="bentConnector2">
+            <a:avLst/>
+          </a:prstGeom>
+        </p:spPr>
+        <p:style>
+          <a:lnRef idx="1">
+            <a:schemeClr val="accent6"/>
+          </a:lnRef>
+          <a:fillRef idx="0">
+            <a:schemeClr val="accent6"/>
+          </a:fillRef>
+          <a:effectRef idx="0">
+            <a:schemeClr val="accent6"/>
+          </a:effectRef>
+          <a:fontRef idx="minor">
+            <a:schemeClr val="tx1"/>
+          </a:fontRef>
+        </p:style>
+      </p:cxnSp>
+      <p:cxnSp>
+        <p:nvCxnSpPr>
+          <p:cNvPr id="37" name="Straight Connector 36"/>
+          <p:cNvCxnSpPr>
+            <a:stCxn id="33" idx="3"/>
+            <a:endCxn id="35" idx="1"/>
+          </p:cNvCxnSpPr>
+          <p:nvPr/>
+        </p:nvCxnSpPr>
+        <p:spPr>
+          <a:xfrm>
+            <a:off x="2540992" y="1052230"/>
+            <a:ext cx="226417" cy="0"/>
           </a:xfrm>
           <a:prstGeom prst="line">
             <a:avLst/>
           </a:prstGeom>
+        </p:spPr>
+        <p:style>
+          <a:lnRef idx="1">
+            <a:schemeClr val="accent6"/>
+          </a:lnRef>
+          <a:fillRef idx="0">
+            <a:schemeClr val="accent6"/>
+          </a:fillRef>
+          <a:effectRef idx="0">
+            <a:schemeClr val="accent6"/>
+          </a:effectRef>
+          <a:fontRef idx="minor">
+            <a:schemeClr val="tx1"/>
+          </a:fontRef>
+        </p:style>
+      </p:cxnSp>
+      <p:cxnSp>
+        <p:nvCxnSpPr>
+          <p:cNvPr id="8" name="Straight Connector 7"/>
+          <p:cNvCxnSpPr>
+            <a:stCxn id="139" idx="3"/>
+            <a:endCxn id="150" idx="1"/>
+          </p:cNvCxnSpPr>
+          <p:nvPr/>
+        </p:nvCxnSpPr>
+        <p:spPr>
+          <a:xfrm flipV="1">
+            <a:off x="3990975" y="3152299"/>
+            <a:ext cx="428625" cy="476"/>
+          </a:xfrm>
+          <a:prstGeom prst="line">
+            <a:avLst/>
+          </a:prstGeom>
+          <a:ln>
+            <a:headEnd type="none" w="med" len="med"/>
+            <a:tailEnd type="triangle" w="med" len="med"/>
+          </a:ln>
         </p:spPr>
         <p:style>
           <a:lnRef idx="1">
@@ -3132,19 +3277,26 @@
         <p:nvCxnSpPr>
           <p:cNvPr id="16" name="Elbow Connector 15"/>
           <p:cNvCxnSpPr>
-            <a:stCxn id="4" idx="3"/>
-            <a:endCxn id="14" idx="1"/>
+            <a:stCxn id="139" idx="3"/>
+            <a:endCxn id="18" idx="0"/>
           </p:cNvCxnSpPr>
           <p:nvPr/>
         </p:nvCxnSpPr>
         <p:spPr>
-          <a:xfrm>
-            <a:off x="4191000" y="906780"/>
-            <a:ext cx="609600" cy="1143000"/>
-          </a:xfrm>
-          <a:prstGeom prst="bentConnector3">
-            <a:avLst/>
+          <a:xfrm flipH="1" flipV="1">
+            <a:off x="1157288" y="2916555"/>
+            <a:ext cx="2833687" cy="236220"/>
+          </a:xfrm>
+          <a:prstGeom prst="bentConnector4">
+            <a:avLst>
+              <a:gd name="adj1" fmla="val -8067"/>
+              <a:gd name="adj2" fmla="val 196774"/>
+            </a:avLst>
           </a:prstGeom>
+          <a:ln>
+            <a:headEnd type="none" w="med" len="med"/>
+            <a:tailEnd type="triangle" w="med" len="med"/>
+          </a:ln>
         </p:spPr>
         <p:style>
           <a:lnRef idx="1">
@@ -3161,16 +3313,326 @@
           </a:fontRef>
         </p:style>
       </p:cxnSp>
-      <p:sp>
-        <p:nvSpPr>
-          <p:cNvPr id="4" name="Rectangle 3"/>
+      <p:cxnSp>
+        <p:nvCxnSpPr>
+          <p:cNvPr id="20" name="Straight Connector 19"/>
+          <p:cNvCxnSpPr>
+            <a:stCxn id="18" idx="3"/>
+          </p:cNvCxnSpPr>
+          <p:nvPr/>
+        </p:nvCxnSpPr>
+        <p:spPr>
+          <a:xfrm>
+            <a:off x="1628775" y="3152775"/>
+            <a:ext cx="304800" cy="0"/>
+          </a:xfrm>
+          <a:prstGeom prst="line">
+            <a:avLst/>
+          </a:prstGeom>
+          <a:ln>
+            <a:headEnd type="none" w="med" len="med"/>
+            <a:tailEnd type="triangle" w="med" len="med"/>
+          </a:ln>
+        </p:spPr>
+        <p:style>
+          <a:lnRef idx="1">
+            <a:schemeClr val="accent6"/>
+          </a:lnRef>
+          <a:fillRef idx="0">
+            <a:schemeClr val="accent6"/>
+          </a:fillRef>
+          <a:effectRef idx="0">
+            <a:schemeClr val="accent6"/>
+          </a:effectRef>
+          <a:fontRef idx="minor">
+            <a:schemeClr val="tx1"/>
+          </a:fontRef>
+        </p:style>
+      </p:cxnSp>
+      <p:sp>
+        <p:nvSpPr>
+          <p:cNvPr id="13" name="TextBox 12"/>
+          <p:cNvSpPr txBox="1"/>
+          <p:nvPr/>
+        </p:nvSpPr>
+        <p:spPr>
+          <a:xfrm>
+            <a:off x="4008910" y="3160216"/>
+            <a:ext cx="410690" cy="215444"/>
+          </a:xfrm>
+          <a:prstGeom prst="rect">
+            <a:avLst/>
+          </a:prstGeom>
+          <a:noFill/>
+        </p:spPr>
+        <p:txBody>
+          <a:bodyPr wrap="none" rtlCol="0">
+            <a:spAutoFit/>
+          </a:bodyPr>
+          <a:lstStyle/>
+          <a:p>
+            <a:r>
+              <a:rPr lang="en-US" sz="800" b="1" dirty="0" smtClean="0">
+                <a:solidFill>
+                  <a:srgbClr val="C00000"/>
+                </a:solidFill>
+              </a:rPr>
+              <a:t>TRUE</a:t>
+            </a:r>
+            <a:endParaRPr lang="en-US" sz="800" b="1" dirty="0">
+              <a:solidFill>
+                <a:srgbClr val="C00000"/>
+              </a:solidFill>
+            </a:endParaRPr>
+          </a:p>
+        </p:txBody>
+      </p:sp>
+      <p:sp>
+        <p:nvSpPr>
+          <p:cNvPr id="18" name="Rectangle 17"/>
           <p:cNvSpPr/>
           <p:nvPr/>
         </p:nvSpPr>
         <p:spPr>
           <a:xfrm>
-            <a:off x="1676400" y="670560"/>
-            <a:ext cx="2514600" cy="472440"/>
+            <a:off x="685800" y="2916555"/>
+            <a:ext cx="942975" cy="472440"/>
+          </a:xfrm>
+          <a:prstGeom prst="rect">
+            <a:avLst/>
+          </a:prstGeom>
+        </p:spPr>
+        <p:style>
+          <a:lnRef idx="2">
+            <a:schemeClr val="accent6">
+              <a:shade val="50000"/>
+            </a:schemeClr>
+          </a:lnRef>
+          <a:fillRef idx="1">
+            <a:schemeClr val="accent6"/>
+          </a:fillRef>
+          <a:effectRef idx="0">
+            <a:schemeClr val="accent6"/>
+          </a:effectRef>
+          <a:fontRef idx="minor">
+            <a:schemeClr val="lt1"/>
+          </a:fontRef>
+        </p:style>
+        <p:txBody>
+          <a:bodyPr rtlCol="0" anchor="ctr"/>
+          <a:lstStyle/>
+          <a:p>
+            <a:pPr algn="ctr"/>
+            <a:r>
+              <a:rPr lang="en-US" sz="1000" dirty="0" smtClean="0"/>
+              <a:t>Key is </a:t>
+            </a:r>
+            <a:r>
+              <a:rPr lang="en-US" sz="1000" dirty="0" smtClean="0"/>
+              <a:t>pressed (convert to  upper case)</a:t>
+            </a:r>
+            <a:endParaRPr lang="en-US" sz="1000" dirty="0"/>
+          </a:p>
+        </p:txBody>
+      </p:sp>
+      <p:sp>
+        <p:nvSpPr>
+          <p:cNvPr id="25" name="TextBox 24"/>
+          <p:cNvSpPr txBox="1"/>
+          <p:nvPr/>
+        </p:nvSpPr>
+        <p:spPr>
+          <a:xfrm>
+            <a:off x="3832860" y="2667000"/>
+            <a:ext cx="434734" cy="215444"/>
+          </a:xfrm>
+          <a:prstGeom prst="rect">
+            <a:avLst/>
+          </a:prstGeom>
+          <a:noFill/>
+        </p:spPr>
+        <p:txBody>
+          <a:bodyPr wrap="none" rtlCol="0">
+            <a:spAutoFit/>
+          </a:bodyPr>
+          <a:lstStyle/>
+          <a:p>
+            <a:r>
+              <a:rPr lang="en-US" sz="800" b="1" dirty="0" smtClean="0">
+                <a:solidFill>
+                  <a:srgbClr val="C00000"/>
+                </a:solidFill>
+              </a:rPr>
+              <a:t>FALSE</a:t>
+            </a:r>
+            <a:endParaRPr lang="en-US" sz="800" b="1" dirty="0">
+              <a:solidFill>
+                <a:srgbClr val="C00000"/>
+              </a:solidFill>
+            </a:endParaRPr>
+          </a:p>
+        </p:txBody>
+      </p:sp>
+      <p:sp>
+        <p:nvSpPr>
+          <p:cNvPr id="15" name="TextBox 14"/>
+          <p:cNvSpPr txBox="1"/>
+          <p:nvPr/>
+        </p:nvSpPr>
+        <p:spPr>
+          <a:xfrm>
+            <a:off x="99985" y="76200"/>
+            <a:ext cx="3688574" cy="369332"/>
+          </a:xfrm>
+          <a:prstGeom prst="rect">
+            <a:avLst/>
+          </a:prstGeom>
+          <a:noFill/>
+        </p:spPr>
+        <p:txBody>
+          <a:bodyPr wrap="none" rtlCol="0">
+            <a:spAutoFit/>
+          </a:bodyPr>
+          <a:lstStyle/>
+          <a:p>
+            <a:r>
+              <a:rPr lang="en-US" b="1" dirty="0" smtClean="0"/>
+              <a:t>Hangman (</a:t>
+            </a:r>
+            <a:r>
+              <a:rPr lang="en-US" b="1" dirty="0" err="1" smtClean="0"/>
+              <a:t>WordGuessGame</a:t>
+            </a:r>
+            <a:r>
+              <a:rPr lang="en-US" b="1" dirty="0" smtClean="0"/>
+              <a:t>) project</a:t>
+            </a:r>
+            <a:endParaRPr lang="en-US" b="1" dirty="0"/>
+          </a:p>
+        </p:txBody>
+      </p:sp>
+      <p:sp>
+        <p:nvSpPr>
+          <p:cNvPr id="26" name="TextBox 25"/>
+          <p:cNvSpPr txBox="1"/>
+          <p:nvPr/>
+        </p:nvSpPr>
+        <p:spPr>
+          <a:xfrm>
+            <a:off x="8431946" y="0"/>
+            <a:ext cx="712054" cy="246221"/>
+          </a:xfrm>
+          <a:prstGeom prst="rect">
+            <a:avLst/>
+          </a:prstGeom>
+          <a:noFill/>
+        </p:spPr>
+        <p:txBody>
+          <a:bodyPr wrap="none" rtlCol="0">
+            <a:spAutoFit/>
+          </a:bodyPr>
+          <a:lstStyle/>
+          <a:p>
+            <a:r>
+              <a:rPr lang="en-US" sz="1000" i="1" dirty="0" smtClean="0"/>
+              <a:t>May 2018</a:t>
+            </a:r>
+            <a:endParaRPr lang="en-US" sz="1000" i="1" dirty="0"/>
+          </a:p>
+        </p:txBody>
+      </p:sp>
+      <p:cxnSp>
+        <p:nvCxnSpPr>
+          <p:cNvPr id="32" name="Straight Connector 31"/>
+          <p:cNvCxnSpPr/>
+          <p:nvPr/>
+        </p:nvCxnSpPr>
+        <p:spPr>
+          <a:xfrm>
+            <a:off x="227412" y="2362200"/>
+            <a:ext cx="8687988" cy="0"/>
+          </a:xfrm>
+          <a:prstGeom prst="line">
+            <a:avLst/>
+          </a:prstGeom>
+          <a:ln w="28575"/>
+        </p:spPr>
+        <p:style>
+          <a:lnRef idx="1">
+            <a:schemeClr val="dk1"/>
+          </a:lnRef>
+          <a:fillRef idx="0">
+            <a:schemeClr val="dk1"/>
+          </a:fillRef>
+          <a:effectRef idx="0">
+            <a:schemeClr val="dk1"/>
+          </a:effectRef>
+          <a:fontRef idx="minor">
+            <a:schemeClr val="tx1"/>
+          </a:fontRef>
+        </p:style>
+      </p:cxnSp>
+      <p:sp>
+        <p:nvSpPr>
+          <p:cNvPr id="33" name="Rectangle 32"/>
+          <p:cNvSpPr/>
+          <p:nvPr/>
+        </p:nvSpPr>
+        <p:spPr>
+          <a:xfrm>
+            <a:off x="1003698" y="809059"/>
+            <a:ext cx="1537294" cy="486341"/>
+          </a:xfrm>
+          <a:prstGeom prst="rect">
+            <a:avLst/>
+          </a:prstGeom>
+        </p:spPr>
+        <p:style>
+          <a:lnRef idx="2">
+            <a:schemeClr val="dk1">
+              <a:shade val="50000"/>
+            </a:schemeClr>
+          </a:lnRef>
+          <a:fillRef idx="1">
+            <a:schemeClr val="dk1"/>
+          </a:fillRef>
+          <a:effectRef idx="0">
+            <a:schemeClr val="dk1"/>
+          </a:effectRef>
+          <a:fontRef idx="minor">
+            <a:schemeClr val="lt1"/>
+          </a:fontRef>
+        </p:style>
+        <p:txBody>
+          <a:bodyPr rtlCol="0" anchor="ctr"/>
+          <a:lstStyle/>
+          <a:p>
+            <a:pPr algn="ctr"/>
+            <a:r>
+              <a:rPr lang="en-US" sz="1000" dirty="0" smtClean="0"/>
+              <a:t>When page loads, choose a random word (</a:t>
+            </a:r>
+            <a:r>
+              <a:rPr lang="en-US" sz="1000" b="1" i="1" dirty="0" smtClean="0"/>
+              <a:t>secret word</a:t>
+            </a:r>
+            <a:r>
+              <a:rPr lang="en-US" sz="1000" dirty="0" smtClean="0"/>
+              <a:t>)</a:t>
+            </a:r>
+          </a:p>
+        </p:txBody>
+      </p:sp>
+      <p:sp>
+        <p:nvSpPr>
+          <p:cNvPr id="35" name="Rectangle 34"/>
+          <p:cNvSpPr/>
+          <p:nvPr/>
+        </p:nvSpPr>
+        <p:spPr>
+          <a:xfrm>
+            <a:off x="2767409" y="809059"/>
+            <a:ext cx="2057400" cy="486341"/>
           </a:xfrm>
           <a:prstGeom prst="rect">
             <a:avLst/>
@@ -3198,43 +3660,148 @@
           <a:p>
             <a:pPr algn="ctr"/>
             <a:r>
-              <a:rPr lang="en-US" sz="1100" dirty="0" smtClean="0"/>
-              <a:t>Check if key is in the </a:t>
-            </a:r>
-            <a:r>
-              <a:rPr lang="en-US" sz="1100" b="1" dirty="0" smtClean="0"/>
-              <a:t>letters</a:t>
-            </a:r>
-            <a:r>
-              <a:rPr lang="en-US" sz="1100" dirty="0"/>
+              <a:rPr lang="en-US" sz="1000" dirty="0" smtClean="0"/>
+              <a:t>For </a:t>
+            </a:r>
+            <a:r>
+              <a:rPr lang="en-US" sz="1000" dirty="0"/>
+              <a:t>each one of </a:t>
+            </a:r>
+            <a:r>
+              <a:rPr lang="en-US" sz="1000" dirty="0" smtClean="0"/>
+              <a:t>the </a:t>
+            </a:r>
+            <a:r>
+              <a:rPr lang="en-US" sz="1000" dirty="0" smtClean="0"/>
+              <a:t>characters in the secret word, push a “_” to a new </a:t>
+            </a:r>
+            <a:r>
+              <a:rPr lang="en-US" sz="1000" b="1" i="1" dirty="0" smtClean="0"/>
+              <a:t>hidden word</a:t>
+            </a:r>
+            <a:r>
+              <a:rPr lang="en-US" sz="1000" i="1" dirty="0" smtClean="0"/>
               <a:t> </a:t>
             </a:r>
             <a:r>
-              <a:rPr lang="en-US" sz="1100" dirty="0" smtClean="0"/>
-              <a:t>array using a for loop. </a:t>
-            </a:r>
-            <a:r>
-              <a:rPr lang="en-US" sz="1100" dirty="0" smtClean="0"/>
-              <a:t>If so, push to </a:t>
-            </a:r>
-            <a:r>
-              <a:rPr lang="en-US" sz="1100" dirty="0" err="1" smtClean="0"/>
-              <a:t>allLetters</a:t>
-            </a:r>
-            <a:endParaRPr lang="en-US" sz="1100" dirty="0"/>
-          </a:p>
-        </p:txBody>
-      </p:sp>
-      <p:sp>
-        <p:nvSpPr>
-          <p:cNvPr id="6" name="Rectangle 5"/>
+              <a:rPr lang="en-US" sz="1000" dirty="0" smtClean="0"/>
+              <a:t>variable</a:t>
+            </a:r>
+            <a:endParaRPr lang="en-US" sz="1000" dirty="0"/>
+          </a:p>
+        </p:txBody>
+      </p:sp>
+      <p:sp>
+        <p:nvSpPr>
+          <p:cNvPr id="43" name="Rectangle 42"/>
           <p:cNvSpPr/>
           <p:nvPr/>
         </p:nvSpPr>
         <p:spPr>
           <a:xfrm>
-            <a:off x="4800600" y="670560"/>
-            <a:ext cx="1981200" cy="472440"/>
+            <a:off x="2767409" y="1571059"/>
+            <a:ext cx="2057400" cy="486341"/>
+          </a:xfrm>
+          <a:prstGeom prst="rect">
+            <a:avLst/>
+          </a:prstGeom>
+        </p:spPr>
+        <p:style>
+          <a:lnRef idx="2">
+            <a:schemeClr val="accent2">
+              <a:shade val="50000"/>
+            </a:schemeClr>
+          </a:lnRef>
+          <a:fillRef idx="1">
+            <a:schemeClr val="accent2"/>
+          </a:fillRef>
+          <a:effectRef idx="0">
+            <a:schemeClr val="accent2"/>
+          </a:effectRef>
+          <a:fontRef idx="minor">
+            <a:schemeClr val="lt1"/>
+          </a:fontRef>
+        </p:style>
+        <p:txBody>
+          <a:bodyPr rtlCol="0" anchor="ctr"/>
+          <a:lstStyle/>
+          <a:p>
+            <a:pPr algn="ctr"/>
+            <a:r>
+              <a:rPr lang="en-US" sz="1000" dirty="0" smtClean="0"/>
+              <a:t>Push each </a:t>
+            </a:r>
+            <a:r>
+              <a:rPr lang="en-US" sz="1000" dirty="0"/>
+              <a:t>one of </a:t>
+            </a:r>
+            <a:r>
+              <a:rPr lang="en-US" sz="1000" dirty="0" smtClean="0"/>
+              <a:t>the </a:t>
+            </a:r>
+            <a:r>
+              <a:rPr lang="en-US" sz="1000" dirty="0" smtClean="0"/>
+              <a:t>characters in the secret word, to a new </a:t>
+            </a:r>
+            <a:r>
+              <a:rPr lang="en-US" sz="1000" b="1" i="1" dirty="0" smtClean="0"/>
+              <a:t>right letters</a:t>
+            </a:r>
+            <a:r>
+              <a:rPr lang="en-US" sz="1000" i="1" dirty="0" smtClean="0"/>
+              <a:t> </a:t>
+            </a:r>
+            <a:r>
+              <a:rPr lang="en-US" sz="1000" dirty="0" smtClean="0"/>
+              <a:t>variable</a:t>
+            </a:r>
+            <a:endParaRPr lang="en-US" sz="1000" dirty="0"/>
+          </a:p>
+        </p:txBody>
+      </p:sp>
+      <p:cxnSp>
+        <p:nvCxnSpPr>
+          <p:cNvPr id="47" name="Straight Connector 46"/>
+          <p:cNvCxnSpPr>
+            <a:stCxn id="35" idx="3"/>
+            <a:endCxn id="51" idx="1"/>
+          </p:cNvCxnSpPr>
+          <p:nvPr/>
+        </p:nvCxnSpPr>
+        <p:spPr>
+          <a:xfrm>
+            <a:off x="4824809" y="1052230"/>
+            <a:ext cx="204391" cy="0"/>
+          </a:xfrm>
+          <a:prstGeom prst="line">
+            <a:avLst/>
+          </a:prstGeom>
+        </p:spPr>
+        <p:style>
+          <a:lnRef idx="1">
+            <a:schemeClr val="accent2"/>
+          </a:lnRef>
+          <a:fillRef idx="0">
+            <a:schemeClr val="accent2"/>
+          </a:fillRef>
+          <a:effectRef idx="0">
+            <a:schemeClr val="accent2"/>
+          </a:effectRef>
+          <a:fontRef idx="minor">
+            <a:schemeClr val="tx1"/>
+          </a:fontRef>
+        </p:style>
+      </p:cxnSp>
+      <p:sp>
+        <p:nvSpPr>
+          <p:cNvPr id="51" name="Rectangle 50"/>
+          <p:cNvSpPr/>
+          <p:nvPr/>
+        </p:nvSpPr>
+        <p:spPr>
+          <a:xfrm>
+            <a:off x="5029200" y="809059"/>
+            <a:ext cx="1219200" cy="486341"/>
           </a:xfrm>
           <a:prstGeom prst="rect">
             <a:avLst/>
@@ -3262,27 +3829,31 @@
           <a:p>
             <a:pPr algn="ctr"/>
             <a:r>
-              <a:rPr lang="en-US" sz="1200" dirty="0" smtClean="0"/>
-              <a:t>Push to </a:t>
-            </a:r>
-            <a:r>
-              <a:rPr lang="en-US" sz="1200" dirty="0" err="1" smtClean="0"/>
-              <a:t>rightLetters</a:t>
-            </a:r>
-            <a:endParaRPr lang="en-US" sz="1200" dirty="0"/>
-          </a:p>
-        </p:txBody>
-      </p:sp>
-      <p:sp>
-        <p:nvSpPr>
-          <p:cNvPr id="13" name="TextBox 12"/>
+              <a:rPr lang="en-US" sz="900" dirty="0" smtClean="0"/>
+              <a:t>Dynamically populate the </a:t>
+            </a:r>
+            <a:r>
+              <a:rPr lang="en-US" sz="900" b="1" i="1" dirty="0" smtClean="0"/>
+              <a:t>hidden word </a:t>
+            </a:r>
+            <a:r>
+              <a:rPr lang="en-US" sz="900" dirty="0" smtClean="0"/>
+              <a:t>into the page</a:t>
+            </a:r>
+            <a:endParaRPr lang="en-US" sz="900" dirty="0"/>
+          </a:p>
+        </p:txBody>
+      </p:sp>
+      <p:sp>
+        <p:nvSpPr>
+          <p:cNvPr id="55" name="TextBox 54"/>
           <p:cNvSpPr txBox="1"/>
           <p:nvPr/>
         </p:nvSpPr>
         <p:spPr>
           <a:xfrm>
-            <a:off x="4480631" y="685800"/>
-            <a:ext cx="377026" cy="253916"/>
+            <a:off x="148886" y="762000"/>
+            <a:ext cx="362600" cy="369332"/>
           </a:xfrm>
           <a:prstGeom prst="rect">
             <a:avLst/>
@@ -3296,31 +3867,240 @@
           <a:lstStyle/>
           <a:p>
             <a:r>
-              <a:rPr lang="en-US" sz="1050" dirty="0" smtClean="0">
+              <a:rPr lang="en-US" b="1" dirty="0" smtClean="0"/>
+              <a:t>1.</a:t>
+            </a:r>
+            <a:endParaRPr lang="en-US" b="1" dirty="0"/>
+          </a:p>
+        </p:txBody>
+      </p:sp>
+      <p:sp>
+        <p:nvSpPr>
+          <p:cNvPr id="56" name="TextBox 55"/>
+          <p:cNvSpPr txBox="1"/>
+          <p:nvPr/>
+        </p:nvSpPr>
+        <p:spPr>
+          <a:xfrm>
+            <a:off x="94600" y="2590800"/>
+            <a:ext cx="362600" cy="369332"/>
+          </a:xfrm>
+          <a:prstGeom prst="rect">
+            <a:avLst/>
+          </a:prstGeom>
+          <a:noFill/>
+        </p:spPr>
+        <p:txBody>
+          <a:bodyPr wrap="none" rtlCol="0">
+            <a:spAutoFit/>
+          </a:bodyPr>
+          <a:lstStyle/>
+          <a:p>
+            <a:r>
+              <a:rPr lang="en-US" b="1" dirty="0" smtClean="0"/>
+              <a:t>2.</a:t>
+            </a:r>
+            <a:endParaRPr lang="en-US" b="1" dirty="0"/>
+          </a:p>
+        </p:txBody>
+      </p:sp>
+      <p:cxnSp>
+        <p:nvCxnSpPr>
+          <p:cNvPr id="63" name="Straight Connector 62"/>
+          <p:cNvCxnSpPr>
+            <a:stCxn id="150" idx="3"/>
+            <a:endCxn id="93" idx="1"/>
+          </p:cNvCxnSpPr>
+          <p:nvPr/>
+        </p:nvCxnSpPr>
+        <p:spPr>
+          <a:xfrm>
+            <a:off x="5457825" y="3152299"/>
+            <a:ext cx="410690" cy="476"/>
+          </a:xfrm>
+          <a:prstGeom prst="line">
+            <a:avLst/>
+          </a:prstGeom>
+          <a:ln>
+            <a:headEnd type="none" w="med" len="med"/>
+            <a:tailEnd type="triangle" w="med" len="med"/>
+          </a:ln>
+        </p:spPr>
+        <p:style>
+          <a:lnRef idx="1">
+            <a:schemeClr val="accent2"/>
+          </a:lnRef>
+          <a:fillRef idx="0">
+            <a:schemeClr val="accent2"/>
+          </a:fillRef>
+          <a:effectRef idx="0">
+            <a:schemeClr val="accent2"/>
+          </a:effectRef>
+          <a:fontRef idx="minor">
+            <a:schemeClr val="tx1"/>
+          </a:fontRef>
+        </p:style>
+      </p:cxnSp>
+      <p:sp>
+        <p:nvSpPr>
+          <p:cNvPr id="64" name="TextBox 63"/>
+          <p:cNvSpPr txBox="1"/>
+          <p:nvPr/>
+        </p:nvSpPr>
+        <p:spPr>
+          <a:xfrm>
+            <a:off x="5457825" y="2948940"/>
+            <a:ext cx="410690" cy="215444"/>
+          </a:xfrm>
+          <a:prstGeom prst="rect">
+            <a:avLst/>
+          </a:prstGeom>
+          <a:noFill/>
+        </p:spPr>
+        <p:txBody>
+          <a:bodyPr wrap="none" rtlCol="0">
+            <a:spAutoFit/>
+          </a:bodyPr>
+          <a:lstStyle/>
+          <a:p>
+            <a:r>
+              <a:rPr lang="en-US" sz="800" b="1" dirty="0" smtClean="0">
                 <a:solidFill>
-                  <a:srgbClr val="FF0000"/>
+                  <a:srgbClr val="C00000"/>
                 </a:solidFill>
               </a:rPr>
-              <a:t>Yes</a:t>
-            </a:r>
-            <a:endParaRPr lang="en-US" sz="1050" dirty="0">
+              <a:t>TRUE</a:t>
+            </a:r>
+            <a:endParaRPr lang="en-US" sz="800" b="1" dirty="0">
               <a:solidFill>
-                <a:srgbClr val="FF0000"/>
+                <a:srgbClr val="C00000"/>
               </a:solidFill>
             </a:endParaRPr>
           </a:p>
         </p:txBody>
       </p:sp>
-      <p:sp>
-        <p:nvSpPr>
-          <p:cNvPr id="14" name="Rectangle 13"/>
+      <p:cxnSp>
+        <p:nvCxnSpPr>
+          <p:cNvPr id="81" name="Elbow Connector 80"/>
+          <p:cNvCxnSpPr>
+            <a:stCxn id="150" idx="2"/>
+            <a:endCxn id="95" idx="1"/>
+          </p:cNvCxnSpPr>
+          <p:nvPr/>
+        </p:nvCxnSpPr>
+        <p:spPr>
+          <a:xfrm rot="16200000" flipH="1">
+            <a:off x="5103577" y="3224131"/>
+            <a:ext cx="600075" cy="929802"/>
+          </a:xfrm>
+          <a:prstGeom prst="bentConnector2">
+            <a:avLst/>
+          </a:prstGeom>
+          <a:ln>
+            <a:headEnd type="none" w="med" len="med"/>
+            <a:tailEnd type="triangle" w="med" len="med"/>
+          </a:ln>
+        </p:spPr>
+        <p:style>
+          <a:lnRef idx="1">
+            <a:schemeClr val="accent2"/>
+          </a:lnRef>
+          <a:fillRef idx="0">
+            <a:schemeClr val="accent2"/>
+          </a:fillRef>
+          <a:effectRef idx="0">
+            <a:schemeClr val="accent2"/>
+          </a:effectRef>
+          <a:fontRef idx="minor">
+            <a:schemeClr val="tx1"/>
+          </a:fontRef>
+        </p:style>
+      </p:cxnSp>
+      <p:sp>
+        <p:nvSpPr>
+          <p:cNvPr id="86" name="TextBox 85"/>
+          <p:cNvSpPr txBox="1"/>
+          <p:nvPr/>
+        </p:nvSpPr>
+        <p:spPr>
+          <a:xfrm>
+            <a:off x="4945067" y="3429000"/>
+            <a:ext cx="434734" cy="215444"/>
+          </a:xfrm>
+          <a:prstGeom prst="rect">
+            <a:avLst/>
+          </a:prstGeom>
+          <a:noFill/>
+        </p:spPr>
+        <p:txBody>
+          <a:bodyPr wrap="none" rtlCol="0">
+            <a:spAutoFit/>
+          </a:bodyPr>
+          <a:lstStyle/>
+          <a:p>
+            <a:r>
+              <a:rPr lang="en-US" sz="800" b="1" dirty="0" smtClean="0">
+                <a:solidFill>
+                  <a:srgbClr val="C00000"/>
+                </a:solidFill>
+              </a:rPr>
+              <a:t>FALSE</a:t>
+            </a:r>
+            <a:endParaRPr lang="en-US" sz="800" b="1" dirty="0">
+              <a:solidFill>
+                <a:srgbClr val="C00000"/>
+              </a:solidFill>
+            </a:endParaRPr>
+          </a:p>
+        </p:txBody>
+      </p:sp>
+      <p:cxnSp>
+        <p:nvCxnSpPr>
+          <p:cNvPr id="88" name="Elbow Connector 87"/>
+          <p:cNvCxnSpPr>
+            <a:stCxn id="150" idx="2"/>
+            <a:endCxn id="96" idx="1"/>
+          </p:cNvCxnSpPr>
+          <p:nvPr/>
+        </p:nvCxnSpPr>
+        <p:spPr>
+          <a:xfrm rot="16200000" flipH="1">
+            <a:off x="4947367" y="3380341"/>
+            <a:ext cx="912495" cy="929802"/>
+          </a:xfrm>
+          <a:prstGeom prst="bentConnector2">
+            <a:avLst/>
+          </a:prstGeom>
+          <a:ln>
+            <a:headEnd type="none" w="med" len="med"/>
+            <a:tailEnd type="triangle" w="med" len="med"/>
+          </a:ln>
+        </p:spPr>
+        <p:style>
+          <a:lnRef idx="1">
+            <a:schemeClr val="accent2"/>
+          </a:lnRef>
+          <a:fillRef idx="0">
+            <a:schemeClr val="accent2"/>
+          </a:fillRef>
+          <a:effectRef idx="0">
+            <a:schemeClr val="accent2"/>
+          </a:effectRef>
+          <a:fontRef idx="minor">
+            <a:schemeClr val="tx1"/>
+          </a:fontRef>
+        </p:style>
+      </p:cxnSp>
+      <p:sp>
+        <p:nvSpPr>
+          <p:cNvPr id="93" name="Rectangle 92"/>
           <p:cNvSpPr/>
           <p:nvPr/>
         </p:nvSpPr>
         <p:spPr>
           <a:xfrm>
-            <a:off x="4800600" y="1813560"/>
-            <a:ext cx="1981200" cy="472440"/>
+            <a:off x="5868515" y="3034665"/>
+            <a:ext cx="1827684" cy="236220"/>
           </a:xfrm>
           <a:prstGeom prst="rect">
             <a:avLst/>
@@ -3348,81 +4128,39 @@
           <a:p>
             <a:pPr algn="ctr"/>
             <a:r>
-              <a:rPr lang="en-US" sz="1200" dirty="0"/>
-              <a:t>Push to </a:t>
-            </a:r>
-            <a:r>
-              <a:rPr lang="en-US" sz="1200" dirty="0" err="1" smtClean="0"/>
-              <a:t>wrongLetters</a:t>
-            </a:r>
-            <a:endParaRPr lang="en-US" sz="1200" dirty="0"/>
-          </a:p>
-        </p:txBody>
-      </p:sp>
-      <p:sp>
-        <p:nvSpPr>
-          <p:cNvPr id="17" name="TextBox 16"/>
-          <p:cNvSpPr txBox="1"/>
+              <a:rPr lang="en-US" sz="1000" dirty="0" smtClean="0"/>
+              <a:t>Give the letter a score of 1</a:t>
+            </a:r>
+            <a:endParaRPr lang="en-US" sz="1000" dirty="0"/>
+          </a:p>
+        </p:txBody>
+      </p:sp>
+      <p:sp>
+        <p:nvSpPr>
+          <p:cNvPr id="95" name="Rectangle 94"/>
+          <p:cNvSpPr/>
           <p:nvPr/>
         </p:nvSpPr>
         <p:spPr>
           <a:xfrm>
-            <a:off x="4480631" y="1812935"/>
-            <a:ext cx="344966" cy="253916"/>
+            <a:off x="5868515" y="3870960"/>
+            <a:ext cx="1827684" cy="236220"/>
           </a:xfrm>
           <a:prstGeom prst="rect">
             <a:avLst/>
           </a:prstGeom>
-          <a:noFill/>
-        </p:spPr>
-        <p:txBody>
-          <a:bodyPr wrap="none" rtlCol="0">
-            <a:spAutoFit/>
-          </a:bodyPr>
-          <a:lstStyle/>
-          <a:p>
-            <a:r>
-              <a:rPr lang="en-US" sz="1050" dirty="0" smtClean="0">
-                <a:solidFill>
-                  <a:srgbClr val="FF0000"/>
-                </a:solidFill>
-              </a:rPr>
-              <a:t>No</a:t>
-            </a:r>
-            <a:endParaRPr lang="en-US" sz="1050" dirty="0">
-              <a:solidFill>
-                <a:srgbClr val="FF0000"/>
-              </a:solidFill>
-            </a:endParaRPr>
-          </a:p>
-        </p:txBody>
-      </p:sp>
-      <p:sp>
-        <p:nvSpPr>
-          <p:cNvPr id="18" name="Rectangle 17"/>
-          <p:cNvSpPr/>
-          <p:nvPr/>
-        </p:nvSpPr>
-        <p:spPr>
-          <a:xfrm>
-            <a:off x="428625" y="670560"/>
-            <a:ext cx="942975" cy="472440"/>
-          </a:xfrm>
-          <a:prstGeom prst="rect">
-            <a:avLst/>
-          </a:prstGeom>
         </p:spPr>
         <p:style>
           <a:lnRef idx="2">
-            <a:schemeClr val="accent6">
+            <a:schemeClr val="accent1">
               <a:shade val="50000"/>
             </a:schemeClr>
           </a:lnRef>
           <a:fillRef idx="1">
-            <a:schemeClr val="accent6"/>
+            <a:schemeClr val="accent1"/>
           </a:fillRef>
           <a:effectRef idx="0">
-            <a:schemeClr val="accent6"/>
+            <a:schemeClr val="accent1"/>
           </a:effectRef>
           <a:fontRef idx="minor">
             <a:schemeClr val="lt1"/>
@@ -3434,30 +4172,219 @@
           <a:p>
             <a:pPr algn="ctr"/>
             <a:r>
-              <a:rPr lang="en-US" sz="1200" dirty="0" smtClean="0"/>
-              <a:t>Key is pressed</a:t>
-            </a:r>
-            <a:endParaRPr lang="en-US" sz="1200" dirty="0"/>
+              <a:rPr lang="en-US" sz="1000" dirty="0" smtClean="0"/>
+              <a:t>Letter score is still 0</a:t>
+            </a:r>
+            <a:endParaRPr lang="en-US" sz="1000" dirty="0"/>
+          </a:p>
+        </p:txBody>
+      </p:sp>
+      <p:sp>
+        <p:nvSpPr>
+          <p:cNvPr id="96" name="Rectangle 95"/>
+          <p:cNvSpPr/>
+          <p:nvPr/>
+        </p:nvSpPr>
+        <p:spPr>
+          <a:xfrm>
+            <a:off x="5868515" y="4183380"/>
+            <a:ext cx="1827684" cy="236220"/>
+          </a:xfrm>
+          <a:prstGeom prst="rect">
+            <a:avLst/>
+          </a:prstGeom>
+        </p:spPr>
+        <p:style>
+          <a:lnRef idx="2">
+            <a:schemeClr val="accent1">
+              <a:shade val="50000"/>
+            </a:schemeClr>
+          </a:lnRef>
+          <a:fillRef idx="1">
+            <a:schemeClr val="accent1"/>
+          </a:fillRef>
+          <a:effectRef idx="0">
+            <a:schemeClr val="accent1"/>
+          </a:effectRef>
+          <a:fontRef idx="minor">
+            <a:schemeClr val="lt1"/>
+          </a:fontRef>
+        </p:style>
+        <p:txBody>
+          <a:bodyPr rtlCol="0" anchor="ctr"/>
+          <a:lstStyle/>
+          <a:p>
+            <a:pPr algn="ctr"/>
+            <a:r>
+              <a:rPr lang="en-US" sz="1000" dirty="0" smtClean="0"/>
+              <a:t>Subtract 1 from </a:t>
+            </a:r>
+            <a:r>
+              <a:rPr lang="en-US" sz="1000" b="1" i="1" dirty="0" smtClean="0"/>
+              <a:t>lives</a:t>
+            </a:r>
+            <a:endParaRPr lang="en-US" sz="1000" b="1" i="1" dirty="0"/>
+          </a:p>
+        </p:txBody>
+      </p:sp>
+      <p:sp>
+        <p:nvSpPr>
+          <p:cNvPr id="104" name="Rectangle 103"/>
+          <p:cNvSpPr/>
+          <p:nvPr/>
+        </p:nvSpPr>
+        <p:spPr>
+          <a:xfrm>
+            <a:off x="5868517" y="4488180"/>
+            <a:ext cx="1827684" cy="236220"/>
+          </a:xfrm>
+          <a:prstGeom prst="rect">
+            <a:avLst/>
+          </a:prstGeom>
+        </p:spPr>
+        <p:style>
+          <a:lnRef idx="2">
+            <a:schemeClr val="accent1">
+              <a:shade val="50000"/>
+            </a:schemeClr>
+          </a:lnRef>
+          <a:fillRef idx="1">
+            <a:schemeClr val="accent1"/>
+          </a:fillRef>
+          <a:effectRef idx="0">
+            <a:schemeClr val="accent1"/>
+          </a:effectRef>
+          <a:fontRef idx="minor">
+            <a:schemeClr val="lt1"/>
+          </a:fontRef>
+        </p:style>
+        <p:txBody>
+          <a:bodyPr rtlCol="0" anchor="ctr"/>
+          <a:lstStyle/>
+          <a:p>
+            <a:pPr algn="ctr"/>
+            <a:r>
+              <a:rPr lang="en-US" sz="1000" dirty="0" smtClean="0"/>
+              <a:t>Push to </a:t>
+            </a:r>
+            <a:r>
+              <a:rPr lang="en-US" sz="1000" b="1" i="1" dirty="0" smtClean="0"/>
+              <a:t>wrong letters</a:t>
+            </a:r>
+            <a:endParaRPr lang="en-US" sz="1000" b="1" i="1" dirty="0"/>
           </a:p>
         </p:txBody>
       </p:sp>
       <p:cxnSp>
         <p:nvCxnSpPr>
-          <p:cNvPr id="20" name="Straight Connector 19"/>
+          <p:cNvPr id="105" name="Elbow Connector 104"/>
           <p:cNvCxnSpPr>
-            <a:stCxn id="18" idx="3"/>
-            <a:endCxn id="4" idx="1"/>
+            <a:stCxn id="150" idx="2"/>
+            <a:endCxn id="104" idx="1"/>
           </p:cNvCxnSpPr>
           <p:nvPr/>
         </p:nvCxnSpPr>
         <p:spPr>
-          <a:xfrm>
-            <a:off x="1371600" y="906780"/>
-            <a:ext cx="304800" cy="0"/>
+          <a:xfrm rot="16200000" flipH="1">
+            <a:off x="4794968" y="3532740"/>
+            <a:ext cx="1217295" cy="929804"/>
+          </a:xfrm>
+          <a:prstGeom prst="bentConnector2">
+            <a:avLst/>
+          </a:prstGeom>
+          <a:ln>
+            <a:headEnd type="none" w="med" len="med"/>
+            <a:tailEnd type="triangle" w="med" len="med"/>
+          </a:ln>
+        </p:spPr>
+        <p:style>
+          <a:lnRef idx="1">
+            <a:schemeClr val="accent2"/>
+          </a:lnRef>
+          <a:fillRef idx="0">
+            <a:schemeClr val="accent2"/>
+          </a:fillRef>
+          <a:effectRef idx="0">
+            <a:schemeClr val="accent2"/>
+          </a:effectRef>
+          <a:fontRef idx="minor">
+            <a:schemeClr val="tx1"/>
+          </a:fontRef>
+        </p:style>
+      </p:cxnSp>
+      <p:sp>
+        <p:nvSpPr>
+          <p:cNvPr id="122" name="Rectangle 121"/>
+          <p:cNvSpPr/>
+          <p:nvPr/>
+        </p:nvSpPr>
+        <p:spPr>
+          <a:xfrm>
+            <a:off x="5868515" y="3327944"/>
+            <a:ext cx="1827685" cy="326797"/>
+          </a:xfrm>
+          <a:prstGeom prst="rect">
+            <a:avLst/>
+          </a:prstGeom>
+        </p:spPr>
+        <p:style>
+          <a:lnRef idx="2">
+            <a:schemeClr val="accent1">
+              <a:shade val="50000"/>
+            </a:schemeClr>
+          </a:lnRef>
+          <a:fillRef idx="1">
+            <a:schemeClr val="accent1"/>
+          </a:fillRef>
+          <a:effectRef idx="0">
+            <a:schemeClr val="accent1"/>
+          </a:effectRef>
+          <a:fontRef idx="minor">
+            <a:schemeClr val="lt1"/>
+          </a:fontRef>
+        </p:style>
+        <p:txBody>
+          <a:bodyPr rtlCol="0" anchor="ctr"/>
+          <a:lstStyle/>
+          <a:p>
+            <a:pPr algn="ctr"/>
+            <a:r>
+              <a:rPr lang="en-US" sz="900" dirty="0" smtClean="0"/>
+              <a:t>Replace the “_” in the </a:t>
+            </a:r>
+            <a:r>
+              <a:rPr lang="en-US" sz="900" b="1" i="1" dirty="0" smtClean="0"/>
+              <a:t>hidden word </a:t>
+            </a:r>
+            <a:r>
+              <a:rPr lang="en-US" sz="900" dirty="0" smtClean="0"/>
+              <a:t>with the correct letter</a:t>
+            </a:r>
+            <a:endParaRPr lang="en-US" sz="900" dirty="0"/>
+          </a:p>
+        </p:txBody>
+      </p:sp>
+      <p:cxnSp>
+        <p:nvCxnSpPr>
+          <p:cNvPr id="125" name="Straight Connector 124"/>
+          <p:cNvCxnSpPr>
+            <a:stCxn id="96" idx="3"/>
+            <a:endCxn id="170" idx="1"/>
+          </p:cNvCxnSpPr>
+          <p:nvPr/>
+        </p:nvCxnSpPr>
+        <p:spPr>
+          <a:xfrm flipV="1">
+            <a:off x="7696199" y="4297680"/>
+            <a:ext cx="152402" cy="3810"/>
           </a:xfrm>
           <a:prstGeom prst="line">
             <a:avLst/>
           </a:prstGeom>
+          <a:ln>
+            <a:headEnd type="none" w="med" len="med"/>
+            <a:tailEnd type="triangle" w="med" len="med"/>
+          </a:ln>
         </p:spPr>
         <p:style>
           <a:lnRef idx="1">
@@ -3476,14 +4403,381 @@
       </p:cxnSp>
       <p:sp>
         <p:nvSpPr>
-          <p:cNvPr id="21" name="TextBox 20"/>
+          <p:cNvPr id="133" name="Rectangle 132"/>
+          <p:cNvSpPr/>
+          <p:nvPr/>
+        </p:nvSpPr>
+        <p:spPr>
+          <a:xfrm>
+            <a:off x="5867400" y="4945380"/>
+            <a:ext cx="1827684" cy="464820"/>
+          </a:xfrm>
+          <a:prstGeom prst="rect">
+            <a:avLst/>
+          </a:prstGeom>
+        </p:spPr>
+        <p:style>
+          <a:lnRef idx="2">
+            <a:schemeClr val="accent1">
+              <a:shade val="50000"/>
+            </a:schemeClr>
+          </a:lnRef>
+          <a:fillRef idx="1">
+            <a:schemeClr val="accent1"/>
+          </a:fillRef>
+          <a:effectRef idx="0">
+            <a:schemeClr val="accent1"/>
+          </a:effectRef>
+          <a:fontRef idx="minor">
+            <a:schemeClr val="lt1"/>
+          </a:fontRef>
+        </p:style>
+        <p:txBody>
+          <a:bodyPr rtlCol="0" anchor="ctr"/>
+          <a:lstStyle/>
+          <a:p>
+            <a:r>
+              <a:rPr lang="en-US" sz="800" dirty="0" smtClean="0"/>
+              <a:t>1. Alert message “Game Over”</a:t>
+            </a:r>
+          </a:p>
+          <a:p>
+            <a:r>
+              <a:rPr lang="en-US" sz="800" dirty="0" smtClean="0"/>
+              <a:t>2. Remove event listener on document</a:t>
+            </a:r>
+          </a:p>
+          <a:p>
+            <a:r>
+              <a:rPr lang="en-US" sz="800" dirty="0" smtClean="0"/>
+              <a:t>3. Reload page (back to step 1)</a:t>
+            </a:r>
+            <a:endParaRPr lang="en-US" sz="800" dirty="0"/>
+          </a:p>
+        </p:txBody>
+      </p:sp>
+      <p:sp>
+        <p:nvSpPr>
+          <p:cNvPr id="139" name="Rectangle 138"/>
+          <p:cNvSpPr/>
+          <p:nvPr/>
+        </p:nvSpPr>
+        <p:spPr>
+          <a:xfrm>
+            <a:off x="1933575" y="2916555"/>
+            <a:ext cx="2057400" cy="472440"/>
+          </a:xfrm>
+          <a:prstGeom prst="rect">
+            <a:avLst/>
+          </a:prstGeom>
+        </p:spPr>
+        <p:style>
+          <a:lnRef idx="2">
+            <a:schemeClr val="accent2">
+              <a:shade val="50000"/>
+            </a:schemeClr>
+          </a:lnRef>
+          <a:fillRef idx="1">
+            <a:schemeClr val="accent2"/>
+          </a:fillRef>
+          <a:effectRef idx="0">
+            <a:schemeClr val="accent2"/>
+          </a:effectRef>
+          <a:fontRef idx="minor">
+            <a:schemeClr val="lt1"/>
+          </a:fontRef>
+        </p:style>
+        <p:txBody>
+          <a:bodyPr rtlCol="0" anchor="ctr"/>
+          <a:lstStyle/>
+          <a:p>
+            <a:pPr algn="ctr"/>
+            <a:r>
+              <a:rPr lang="en-US" sz="1000" dirty="0" smtClean="0"/>
+              <a:t>Check if key is in the </a:t>
+            </a:r>
+            <a:r>
+              <a:rPr lang="en-US" sz="1000" b="1" dirty="0" smtClean="0"/>
+              <a:t>letters</a:t>
+            </a:r>
+            <a:r>
+              <a:rPr lang="en-US" sz="1000" dirty="0"/>
+              <a:t> </a:t>
+            </a:r>
+            <a:r>
+              <a:rPr lang="en-US" sz="1000" dirty="0" smtClean="0"/>
+              <a:t>array </a:t>
+            </a:r>
+            <a:r>
+              <a:rPr lang="en-US" sz="1000" dirty="0" smtClean="0"/>
+              <a:t>(meaning it is a valid entry) </a:t>
+            </a:r>
+            <a:r>
+              <a:rPr lang="en-US" sz="1000" dirty="0" smtClean="0">
+                <a:solidFill>
+                  <a:srgbClr val="FFFF00"/>
+                </a:solidFill>
+              </a:rPr>
+              <a:t>AND</a:t>
+            </a:r>
+            <a:r>
+              <a:rPr lang="en-US" sz="1000" b="1" dirty="0" smtClean="0"/>
+              <a:t> </a:t>
+            </a:r>
+            <a:r>
+              <a:rPr lang="en-US" sz="1000" dirty="0" smtClean="0"/>
+              <a:t>that</a:t>
+            </a:r>
+            <a:r>
+              <a:rPr lang="en-US" sz="1000" dirty="0" smtClean="0"/>
+              <a:t> it has not been already pressed</a:t>
+            </a:r>
+            <a:endParaRPr lang="en-US" sz="1000" dirty="0"/>
+          </a:p>
+        </p:txBody>
+      </p:sp>
+      <p:sp>
+        <p:nvSpPr>
+          <p:cNvPr id="150" name="Rectangle 149"/>
+          <p:cNvSpPr/>
+          <p:nvPr/>
+        </p:nvSpPr>
+        <p:spPr>
+          <a:xfrm>
+            <a:off x="4419600" y="2915602"/>
+            <a:ext cx="1038225" cy="473393"/>
+          </a:xfrm>
+          <a:prstGeom prst="rect">
+            <a:avLst/>
+          </a:prstGeom>
+        </p:spPr>
+        <p:style>
+          <a:lnRef idx="2">
+            <a:schemeClr val="accent2">
+              <a:shade val="50000"/>
+            </a:schemeClr>
+          </a:lnRef>
+          <a:fillRef idx="1">
+            <a:schemeClr val="accent2"/>
+          </a:fillRef>
+          <a:effectRef idx="0">
+            <a:schemeClr val="accent2"/>
+          </a:effectRef>
+          <a:fontRef idx="minor">
+            <a:schemeClr val="lt1"/>
+          </a:fontRef>
+        </p:style>
+        <p:txBody>
+          <a:bodyPr rtlCol="0" anchor="ctr"/>
+          <a:lstStyle/>
+          <a:p>
+            <a:pPr algn="ctr"/>
+            <a:r>
+              <a:rPr lang="en-US" sz="900" dirty="0" smtClean="0"/>
+              <a:t>Check if the key is one of the </a:t>
+            </a:r>
+            <a:r>
+              <a:rPr lang="en-US" sz="900" b="1" i="1" dirty="0" smtClean="0"/>
+              <a:t>right </a:t>
+            </a:r>
+            <a:r>
+              <a:rPr lang="en-US" sz="900" b="1" i="1" smtClean="0"/>
+              <a:t>letters</a:t>
+            </a:r>
+            <a:r>
+              <a:rPr lang="en-US" sz="900" smtClean="0"/>
+              <a:t>.</a:t>
+            </a:r>
+            <a:endParaRPr lang="en-US" sz="900" dirty="0"/>
+          </a:p>
+        </p:txBody>
+      </p:sp>
+      <p:sp>
+        <p:nvSpPr>
+          <p:cNvPr id="170" name="Rectangle 169"/>
+          <p:cNvSpPr/>
+          <p:nvPr/>
+        </p:nvSpPr>
+        <p:spPr>
+          <a:xfrm>
+            <a:off x="7848601" y="3870960"/>
+            <a:ext cx="533399" cy="853440"/>
+          </a:xfrm>
+          <a:prstGeom prst="rect">
+            <a:avLst/>
+          </a:prstGeom>
+        </p:spPr>
+        <p:style>
+          <a:lnRef idx="2">
+            <a:schemeClr val="accent2">
+              <a:shade val="50000"/>
+            </a:schemeClr>
+          </a:lnRef>
+          <a:fillRef idx="1">
+            <a:schemeClr val="accent2"/>
+          </a:fillRef>
+          <a:effectRef idx="0">
+            <a:schemeClr val="accent2"/>
+          </a:effectRef>
+          <a:fontRef idx="minor">
+            <a:schemeClr val="lt1"/>
+          </a:fontRef>
+        </p:style>
+        <p:txBody>
+          <a:bodyPr rtlCol="0" anchor="ctr"/>
+          <a:lstStyle/>
+          <a:p>
+            <a:pPr algn="ctr"/>
+            <a:r>
+              <a:rPr lang="en-US" sz="1000" dirty="0" smtClean="0"/>
+              <a:t>Check if </a:t>
+            </a:r>
+            <a:r>
+              <a:rPr lang="en-US" sz="1000" b="1" i="1" dirty="0" smtClean="0"/>
+              <a:t>lives</a:t>
+            </a:r>
+            <a:r>
+              <a:rPr lang="en-US" sz="1000" dirty="0" smtClean="0"/>
+              <a:t> is 0</a:t>
+            </a:r>
+            <a:endParaRPr lang="en-US" sz="1000" b="1" i="1" dirty="0"/>
+          </a:p>
+        </p:txBody>
+      </p:sp>
+      <p:sp>
+        <p:nvSpPr>
+          <p:cNvPr id="173" name="Rectangle 172"/>
+          <p:cNvSpPr/>
+          <p:nvPr/>
+        </p:nvSpPr>
+        <p:spPr>
+          <a:xfrm>
+            <a:off x="7848600" y="3034665"/>
+            <a:ext cx="885825" cy="620075"/>
+          </a:xfrm>
+          <a:prstGeom prst="rect">
+            <a:avLst/>
+          </a:prstGeom>
+        </p:spPr>
+        <p:style>
+          <a:lnRef idx="2">
+            <a:schemeClr val="accent2">
+              <a:shade val="50000"/>
+            </a:schemeClr>
+          </a:lnRef>
+          <a:fillRef idx="1">
+            <a:schemeClr val="accent2"/>
+          </a:fillRef>
+          <a:effectRef idx="0">
+            <a:schemeClr val="accent2"/>
+          </a:effectRef>
+          <a:fontRef idx="minor">
+            <a:schemeClr val="lt1"/>
+          </a:fontRef>
+        </p:style>
+        <p:txBody>
+          <a:bodyPr rtlCol="0" anchor="ctr"/>
+          <a:lstStyle/>
+          <a:p>
+            <a:pPr algn="ctr"/>
+            <a:r>
+              <a:rPr lang="en-US" sz="1000" dirty="0" smtClean="0"/>
+              <a:t>Check if there are any “_” in </a:t>
+            </a:r>
+            <a:r>
+              <a:rPr lang="en-US" sz="1000" b="1" i="1" dirty="0" smtClean="0"/>
+              <a:t>hidden word</a:t>
+            </a:r>
+            <a:endParaRPr lang="en-US" sz="1000" b="1" i="1" dirty="0"/>
+          </a:p>
+        </p:txBody>
+      </p:sp>
+      <p:cxnSp>
+        <p:nvCxnSpPr>
+          <p:cNvPr id="175" name="Elbow Connector 174"/>
+          <p:cNvCxnSpPr>
+            <a:stCxn id="122" idx="3"/>
+            <a:endCxn id="173" idx="1"/>
+          </p:cNvCxnSpPr>
+          <p:nvPr/>
+        </p:nvCxnSpPr>
+        <p:spPr>
+          <a:xfrm flipV="1">
+            <a:off x="7696200" y="3344703"/>
+            <a:ext cx="152400" cy="146640"/>
+          </a:xfrm>
+          <a:prstGeom prst="bentConnector3">
+            <a:avLst/>
+          </a:prstGeom>
+          <a:ln>
+            <a:headEnd type="none" w="med" len="med"/>
+            <a:tailEnd type="triangle" w="med" len="med"/>
+          </a:ln>
+        </p:spPr>
+        <p:style>
+          <a:lnRef idx="1">
+            <a:schemeClr val="accent1"/>
+          </a:lnRef>
+          <a:fillRef idx="0">
+            <a:schemeClr val="accent1"/>
+          </a:fillRef>
+          <a:effectRef idx="0">
+            <a:schemeClr val="accent1"/>
+          </a:effectRef>
+          <a:fontRef idx="minor">
+            <a:schemeClr val="tx1"/>
+          </a:fontRef>
+        </p:style>
+      </p:cxnSp>
+      <p:cxnSp>
+        <p:nvCxnSpPr>
+          <p:cNvPr id="176" name="Elbow Connector 175"/>
+          <p:cNvCxnSpPr>
+            <a:stCxn id="173" idx="3"/>
+            <a:endCxn id="188" idx="3"/>
+          </p:cNvCxnSpPr>
+          <p:nvPr/>
+        </p:nvCxnSpPr>
+        <p:spPr>
+          <a:xfrm flipH="1">
+            <a:off x="7696202" y="3344703"/>
+            <a:ext cx="1038223" cy="2598897"/>
+          </a:xfrm>
+          <a:prstGeom prst="bentConnector3">
+            <a:avLst>
+              <a:gd name="adj1" fmla="val -11009"/>
+            </a:avLst>
+          </a:prstGeom>
+          <a:ln>
+            <a:headEnd type="none" w="med" len="med"/>
+            <a:tailEnd type="triangle" w="med" len="med"/>
+          </a:ln>
+        </p:spPr>
+        <p:style>
+          <a:lnRef idx="1">
+            <a:schemeClr val="accent2"/>
+          </a:lnRef>
+          <a:fillRef idx="0">
+            <a:schemeClr val="accent2"/>
+          </a:fillRef>
+          <a:effectRef idx="0">
+            <a:schemeClr val="accent2"/>
+          </a:effectRef>
+          <a:fontRef idx="minor">
+            <a:schemeClr val="tx1"/>
+          </a:fontRef>
+        </p:style>
+      </p:cxnSp>
+      <p:sp>
+        <p:nvSpPr>
+          <p:cNvPr id="182" name="TextBox 181"/>
           <p:cNvSpPr txBox="1"/>
           <p:nvPr/>
         </p:nvSpPr>
         <p:spPr>
           <a:xfrm>
-            <a:off x="457200" y="518160"/>
-            <a:ext cx="258084" cy="138499"/>
+            <a:off x="7742710" y="4963389"/>
+            <a:ext cx="410690" cy="215444"/>
           </a:xfrm>
           <a:prstGeom prst="rect">
             <a:avLst/>
@@ -3491,22 +4785,22 @@
           <a:noFill/>
         </p:spPr>
         <p:txBody>
-          <a:bodyPr wrap="none" lIns="0" tIns="0" rIns="0" bIns="0" rtlCol="0" anchor="ctr" anchorCtr="0">
+          <a:bodyPr wrap="none" rtlCol="0">
             <a:spAutoFit/>
           </a:bodyPr>
           <a:lstStyle/>
           <a:p>
             <a:r>
-              <a:rPr lang="en-US" sz="900" i="1" dirty="0" smtClean="0">
+              <a:rPr lang="en-US" sz="800" b="1" dirty="0" smtClean="0">
                 <a:solidFill>
-                  <a:schemeClr val="accent6"/>
+                  <a:srgbClr val="C00000"/>
                 </a:solidFill>
               </a:rPr>
-              <a:t>event</a:t>
-            </a:r>
-            <a:endParaRPr lang="en-US" sz="900" i="1" dirty="0">
+              <a:t>TRUE</a:t>
+            </a:r>
+            <a:endParaRPr lang="en-US" sz="800" b="1" dirty="0">
               <a:solidFill>
-                <a:schemeClr val="accent6"/>
+                <a:srgbClr val="C00000"/>
               </a:solidFill>
             </a:endParaRPr>
           </a:p>
@@ -3514,14 +4808,14 @@
       </p:sp>
       <p:sp>
         <p:nvSpPr>
-          <p:cNvPr id="22" name="TextBox 21"/>
+          <p:cNvPr id="183" name="TextBox 182"/>
           <p:cNvSpPr txBox="1"/>
           <p:nvPr/>
         </p:nvSpPr>
         <p:spPr>
           <a:xfrm>
-            <a:off x="1676400" y="518160"/>
-            <a:ext cx="205184" cy="138499"/>
+            <a:off x="8458200" y="3670756"/>
+            <a:ext cx="410690" cy="215444"/>
           </a:xfrm>
           <a:prstGeom prst="rect">
             <a:avLst/>
@@ -3529,27 +4823,262 @@
           <a:noFill/>
         </p:spPr>
         <p:txBody>
-          <a:bodyPr wrap="none" lIns="0" tIns="0" rIns="0" bIns="0" rtlCol="0" anchor="ctr" anchorCtr="0">
+          <a:bodyPr wrap="none" rtlCol="0">
             <a:spAutoFit/>
           </a:bodyPr>
           <a:lstStyle/>
           <a:p>
             <a:r>
-              <a:rPr lang="en-US" sz="900" i="1" dirty="0" smtClean="0">
+              <a:rPr lang="en-US" sz="800" b="1" dirty="0" smtClean="0">
                 <a:solidFill>
-                  <a:srgbClr val="FF0000"/>
+                  <a:srgbClr val="C00000"/>
                 </a:solidFill>
               </a:rPr>
-              <a:t>loop</a:t>
-            </a:r>
-            <a:endParaRPr lang="en-US" sz="900" i="1" dirty="0">
+              <a:t>TRUE</a:t>
+            </a:r>
+            <a:endParaRPr lang="en-US" sz="800" b="1" dirty="0">
               <a:solidFill>
-                <a:srgbClr val="FF0000"/>
+                <a:srgbClr val="C00000"/>
               </a:solidFill>
             </a:endParaRPr>
           </a:p>
         </p:txBody>
       </p:sp>
+      <p:cxnSp>
+        <p:nvCxnSpPr>
+          <p:cNvPr id="185" name="Elbow Connector 184"/>
+          <p:cNvCxnSpPr>
+            <a:stCxn id="194" idx="1"/>
+            <a:endCxn id="18" idx="2"/>
+          </p:cNvCxnSpPr>
+          <p:nvPr/>
+        </p:nvCxnSpPr>
+        <p:spPr>
+          <a:xfrm rot="10800000">
+            <a:off x="1157288" y="3388996"/>
+            <a:ext cx="1966912" cy="2554605"/>
+          </a:xfrm>
+          <a:prstGeom prst="bentConnector2">
+            <a:avLst/>
+          </a:prstGeom>
+          <a:ln>
+            <a:headEnd type="none" w="med" len="med"/>
+            <a:tailEnd type="triangle" w="med" len="med"/>
+          </a:ln>
+        </p:spPr>
+        <p:style>
+          <a:lnRef idx="1">
+            <a:schemeClr val="accent1"/>
+          </a:lnRef>
+          <a:fillRef idx="0">
+            <a:schemeClr val="accent1"/>
+          </a:fillRef>
+          <a:effectRef idx="0">
+            <a:schemeClr val="accent1"/>
+          </a:effectRef>
+          <a:fontRef idx="minor">
+            <a:schemeClr val="tx1"/>
+          </a:fontRef>
+        </p:style>
+      </p:cxnSp>
+      <p:sp>
+        <p:nvSpPr>
+          <p:cNvPr id="188" name="Rectangle 187"/>
+          <p:cNvSpPr/>
+          <p:nvPr/>
+        </p:nvSpPr>
+        <p:spPr>
+          <a:xfrm>
+            <a:off x="5868518" y="5638800"/>
+            <a:ext cx="1827684" cy="609600"/>
+          </a:xfrm>
+          <a:prstGeom prst="rect">
+            <a:avLst/>
+          </a:prstGeom>
+        </p:spPr>
+        <p:style>
+          <a:lnRef idx="2">
+            <a:schemeClr val="accent1">
+              <a:shade val="50000"/>
+            </a:schemeClr>
+          </a:lnRef>
+          <a:fillRef idx="1">
+            <a:schemeClr val="accent1"/>
+          </a:fillRef>
+          <a:effectRef idx="0">
+            <a:schemeClr val="accent1"/>
+          </a:effectRef>
+          <a:fontRef idx="minor">
+            <a:schemeClr val="lt1"/>
+          </a:fontRef>
+        </p:style>
+        <p:txBody>
+          <a:bodyPr rtlCol="0" anchor="ctr"/>
+          <a:lstStyle/>
+          <a:p>
+            <a:r>
+              <a:rPr lang="en-US" sz="800" dirty="0" smtClean="0"/>
+              <a:t>1. Alert message “You win!”</a:t>
+            </a:r>
+          </a:p>
+          <a:p>
+            <a:r>
+              <a:rPr lang="en-US" sz="800" dirty="0" smtClean="0"/>
+              <a:t>2. Remove event listener on document</a:t>
+            </a:r>
+          </a:p>
+          <a:p>
+            <a:r>
+              <a:rPr lang="en-US" sz="800" dirty="0" smtClean="0"/>
+              <a:t>3. Add 1 to </a:t>
+            </a:r>
+            <a:r>
+              <a:rPr lang="en-US" sz="800" b="1" i="1" dirty="0" smtClean="0"/>
+              <a:t>wins</a:t>
+            </a:r>
+          </a:p>
+          <a:p>
+            <a:r>
+              <a:rPr lang="en-US" sz="800" dirty="0" smtClean="0"/>
+              <a:t>4. Run the game reset function</a:t>
+            </a:r>
+            <a:endParaRPr lang="en-US" sz="800" dirty="0"/>
+          </a:p>
+        </p:txBody>
+      </p:sp>
+      <p:sp>
+        <p:nvSpPr>
+          <p:cNvPr id="194" name="Rectangle 193"/>
+          <p:cNvSpPr/>
+          <p:nvPr/>
+        </p:nvSpPr>
+        <p:spPr>
+          <a:xfrm>
+            <a:off x="3124200" y="5638800"/>
+            <a:ext cx="2399591" cy="609600"/>
+          </a:xfrm>
+          <a:prstGeom prst="rect">
+            <a:avLst/>
+          </a:prstGeom>
+        </p:spPr>
+        <p:style>
+          <a:lnRef idx="2">
+            <a:schemeClr val="accent1">
+              <a:shade val="50000"/>
+            </a:schemeClr>
+          </a:lnRef>
+          <a:fillRef idx="1">
+            <a:schemeClr val="accent1"/>
+          </a:fillRef>
+          <a:effectRef idx="0">
+            <a:schemeClr val="accent1"/>
+          </a:effectRef>
+          <a:fontRef idx="minor">
+            <a:schemeClr val="lt1"/>
+          </a:fontRef>
+        </p:style>
+        <p:txBody>
+          <a:bodyPr rtlCol="0" anchor="ctr"/>
+          <a:lstStyle/>
+          <a:p>
+            <a:r>
+              <a:rPr lang="en-US" sz="900" u="sng" dirty="0" smtClean="0"/>
+              <a:t>Game reset function</a:t>
+            </a:r>
+          </a:p>
+          <a:p>
+            <a:r>
+              <a:rPr lang="en-US" sz="900" dirty="0" smtClean="0"/>
+              <a:t>1. Reset all values for </a:t>
+            </a:r>
+            <a:r>
+              <a:rPr lang="en-US" sz="900" b="1" i="1" dirty="0" smtClean="0"/>
+              <a:t>secret word</a:t>
+            </a:r>
+            <a:r>
+              <a:rPr lang="en-US" sz="900" dirty="0" smtClean="0"/>
+              <a:t>, </a:t>
+            </a:r>
+            <a:r>
+              <a:rPr lang="en-US" sz="900" b="1" i="1" dirty="0" smtClean="0"/>
+              <a:t>hidden word</a:t>
+            </a:r>
+            <a:r>
+              <a:rPr lang="en-US" sz="900" dirty="0" smtClean="0"/>
+              <a:t>, </a:t>
+            </a:r>
+            <a:r>
+              <a:rPr lang="en-US" sz="900" b="1" i="1" dirty="0" smtClean="0"/>
+              <a:t>lives</a:t>
+            </a:r>
+            <a:r>
+              <a:rPr lang="en-US" sz="900" dirty="0" smtClean="0"/>
+              <a:t>, </a:t>
+            </a:r>
+            <a:r>
+              <a:rPr lang="en-US" sz="900" b="1" i="1" dirty="0" smtClean="0"/>
+              <a:t>wrong letters</a:t>
+            </a:r>
+            <a:r>
+              <a:rPr lang="en-US" sz="900" dirty="0" smtClean="0"/>
+              <a:t>, </a:t>
+            </a:r>
+            <a:r>
+              <a:rPr lang="en-US" sz="900" b="1" i="1" dirty="0" smtClean="0"/>
+              <a:t>right letters</a:t>
+            </a:r>
+            <a:r>
+              <a:rPr lang="en-US" sz="900" dirty="0" smtClean="0"/>
+              <a:t>.</a:t>
+            </a:r>
+            <a:endParaRPr lang="en-US" sz="500" dirty="0" smtClean="0"/>
+          </a:p>
+          <a:p>
+            <a:r>
+              <a:rPr lang="en-US" sz="900" dirty="0" smtClean="0"/>
+              <a:t>2. Add event listener to document</a:t>
+            </a:r>
+            <a:endParaRPr lang="en-US" sz="900" dirty="0"/>
+          </a:p>
+        </p:txBody>
+      </p:sp>
+      <p:cxnSp>
+        <p:nvCxnSpPr>
+          <p:cNvPr id="197" name="Straight Arrow Connector 196"/>
+          <p:cNvCxnSpPr>
+            <a:stCxn id="188" idx="1"/>
+            <a:endCxn id="194" idx="3"/>
+          </p:cNvCxnSpPr>
+          <p:nvPr/>
+        </p:nvCxnSpPr>
+        <p:spPr>
+          <a:xfrm flipH="1">
+            <a:off x="5523791" y="5943600"/>
+            <a:ext cx="344727" cy="0"/>
+          </a:xfrm>
+          <a:prstGeom prst="straightConnector1">
+            <a:avLst/>
+          </a:prstGeom>
+          <a:ln>
+            <a:headEnd type="none" w="med" len="med"/>
+            <a:tailEnd type="triangle" w="med" len="med"/>
+          </a:ln>
+        </p:spPr>
+        <p:style>
+          <a:lnRef idx="1">
+            <a:schemeClr val="accent1"/>
+          </a:lnRef>
+          <a:fillRef idx="0">
+            <a:schemeClr val="accent1"/>
+          </a:fillRef>
+          <a:effectRef idx="0">
+            <a:schemeClr val="accent1"/>
+          </a:effectRef>
+          <a:fontRef idx="minor">
+            <a:schemeClr val="tx1"/>
+          </a:fontRef>
+        </p:style>
+      </p:cxnSp>
     </p:spTree>
     <p:extLst>
       <p:ext uri="{BB962C8B-B14F-4D97-AF65-F5344CB8AC3E}">

</xml_diff>